<commit_message>
fixed title slide problem
</commit_message>
<xml_diff>
--- a/r_intro_students.pptx
+++ b/r_intro_students.pptx
@@ -687,9 +687,6 @@
     </pc:docChg>
   </pc:docChgLst>
   <pc:docChgLst>
-    <pc:chgData name="Jay Cao" userId="24e21172780c2dbf" providerId="LiveId" clId="{860E650B-3859-43B6-9BCC-4823335007C2}"/>
-  </pc:docChgLst>
-  <pc:docChgLst>
     <pc:chgData name="Jay Cao" userId="24e21172780c2dbf" providerId="LiveId" clId="{09A2675D-6DE3-4BF7-8BDE-5EEC64CB58B6}"/>
     <pc:docChg chg="undo custSel addSld modSld">
       <pc:chgData name="Jay Cao" userId="24e21172780c2dbf" providerId="LiveId" clId="{09A2675D-6DE3-4BF7-8BDE-5EEC64CB58B6}" dt="2019-10-02T21:17:48.278" v="850" actId="20577"/>
@@ -1102,6 +1099,9 @@
       </pc:sldChg>
     </pc:docChg>
   </pc:docChgLst>
+  <pc:docChgLst>
+    <pc:chgData name="Jay Cao" userId="24e21172780c2dbf" providerId="LiveId" clId="{860E650B-3859-43B6-9BCC-4823335007C2}"/>
+  </pc:docChgLst>
 </pc:chgInfo>
 </file>
 
@@ -1187,7 +1187,7 @@
           <a:p>
             <a:fld id="{0A9A628E-7277-4438-8DF0-5778D2FD5FD3}" type="datetimeFigureOut">
               <a:rPr lang="en-US" smtClean="0"/>
-              <a:t>11/4/2019</a:t>
+              <a:t>11/5/2019</a:t>
             </a:fld>
             <a:endParaRPr lang="en-US"/>
           </a:p>
@@ -1769,7 +1769,7 @@
           <a:p>
             <a:fld id="{2E9B9F13-826C-4D2E-B836-5B52099325F3}" type="datetimeFigureOut">
               <a:rPr lang="en-US" smtClean="0"/>
-              <a:t>11/4/2019</a:t>
+              <a:t>11/5/2019</a:t>
             </a:fld>
             <a:endParaRPr lang="en-US"/>
           </a:p>
@@ -1967,7 +1967,7 @@
           <a:p>
             <a:fld id="{2E9B9F13-826C-4D2E-B836-5B52099325F3}" type="datetimeFigureOut">
               <a:rPr lang="en-US" smtClean="0"/>
-              <a:t>11/4/2019</a:t>
+              <a:t>11/5/2019</a:t>
             </a:fld>
             <a:endParaRPr lang="en-US"/>
           </a:p>
@@ -2175,7 +2175,7 @@
           <a:p>
             <a:fld id="{2E9B9F13-826C-4D2E-B836-5B52099325F3}" type="datetimeFigureOut">
               <a:rPr lang="en-US" smtClean="0"/>
-              <a:t>11/4/2019</a:t>
+              <a:t>11/5/2019</a:t>
             </a:fld>
             <a:endParaRPr lang="en-US"/>
           </a:p>
@@ -2500,7 +2500,7 @@
             <a:fld id="{56ED6557-8EC6-45FC-B359-5D206E9600ED}" type="datetime1">
               <a:rPr lang="en-US" smtClean="0"/>
               <a:pPr/>
-              <a:t>11/4/2019</a:t>
+              <a:t>11/5/2019</a:t>
             </a:fld>
             <a:endParaRPr lang="en-US" dirty="0"/>
           </a:p>
@@ -2777,7 +2777,7 @@
           <a:p>
             <a:fld id="{2E9B9F13-826C-4D2E-B836-5B52099325F3}" type="datetimeFigureOut">
               <a:rPr lang="en-US" smtClean="0"/>
-              <a:t>11/4/2019</a:t>
+              <a:t>11/5/2019</a:t>
             </a:fld>
             <a:endParaRPr lang="en-US"/>
           </a:p>
@@ -3052,7 +3052,7 @@
           <a:p>
             <a:fld id="{2E9B9F13-826C-4D2E-B836-5B52099325F3}" type="datetimeFigureOut">
               <a:rPr lang="en-US" smtClean="0"/>
-              <a:t>11/4/2019</a:t>
+              <a:t>11/5/2019</a:t>
             </a:fld>
             <a:endParaRPr lang="en-US"/>
           </a:p>
@@ -3317,7 +3317,7 @@
           <a:p>
             <a:fld id="{2E9B9F13-826C-4D2E-B836-5B52099325F3}" type="datetimeFigureOut">
               <a:rPr lang="en-US" smtClean="0"/>
-              <a:t>11/4/2019</a:t>
+              <a:t>11/5/2019</a:t>
             </a:fld>
             <a:endParaRPr lang="en-US"/>
           </a:p>
@@ -3729,7 +3729,7 @@
           <a:p>
             <a:fld id="{2E9B9F13-826C-4D2E-B836-5B52099325F3}" type="datetimeFigureOut">
               <a:rPr lang="en-US" smtClean="0"/>
-              <a:t>11/4/2019</a:t>
+              <a:t>11/5/2019</a:t>
             </a:fld>
             <a:endParaRPr lang="en-US"/>
           </a:p>
@@ -3870,7 +3870,7 @@
           <a:p>
             <a:fld id="{2E9B9F13-826C-4D2E-B836-5B52099325F3}" type="datetimeFigureOut">
               <a:rPr lang="en-US" smtClean="0"/>
-              <a:t>11/4/2019</a:t>
+              <a:t>11/5/2019</a:t>
             </a:fld>
             <a:endParaRPr lang="en-US"/>
           </a:p>
@@ -3983,7 +3983,7 @@
           <a:p>
             <a:fld id="{2E9B9F13-826C-4D2E-B836-5B52099325F3}" type="datetimeFigureOut">
               <a:rPr lang="en-US" smtClean="0"/>
-              <a:t>11/4/2019</a:t>
+              <a:t>11/5/2019</a:t>
             </a:fld>
             <a:endParaRPr lang="en-US"/>
           </a:p>
@@ -4294,7 +4294,7 @@
           <a:p>
             <a:fld id="{2E9B9F13-826C-4D2E-B836-5B52099325F3}" type="datetimeFigureOut">
               <a:rPr lang="en-US" smtClean="0"/>
-              <a:t>11/4/2019</a:t>
+              <a:t>11/5/2019</a:t>
             </a:fld>
             <a:endParaRPr lang="en-US"/>
           </a:p>
@@ -4582,7 +4582,7 @@
           <a:p>
             <a:fld id="{2E9B9F13-826C-4D2E-B836-5B52099325F3}" type="datetimeFigureOut">
               <a:rPr lang="en-US" smtClean="0"/>
-              <a:t>11/4/2019</a:t>
+              <a:t>11/5/2019</a:t>
             </a:fld>
             <a:endParaRPr lang="en-US"/>
           </a:p>
@@ -4823,7 +4823,7 @@
           <a:p>
             <a:fld id="{2E9B9F13-826C-4D2E-B836-5B52099325F3}" type="datetimeFigureOut">
               <a:rPr lang="en-US" smtClean="0"/>
-              <a:t>11/4/2019</a:t>
+              <a:t>11/5/2019</a:t>
             </a:fld>
             <a:endParaRPr lang="en-US"/>
           </a:p>
@@ -5282,7 +5282,7 @@
           <a:p>
             <a:r>
               <a:rPr lang="en-US" dirty="0"/>
-              <a:t>R Workshop for Researchers</a:t>
+              <a:t>R Workshop</a:t>
             </a:r>
           </a:p>
         </p:txBody>
@@ -5315,7 +5315,7 @@
                 </a:solidFill>
                 <a:latin typeface="+mj-lt"/>
               </a:rPr>
-              <a:t>November 4, 2019</a:t>
+              <a:t>November 5, 2019</a:t>
             </a:fld>
             <a:r>
               <a:rPr lang="en-CA" sz="1400" b="1" dirty="0">

</xml_diff>